<commit_message>
updated fam findings graph on pp
</commit_message>
<xml_diff>
--- a/Project One Presentation.pptx
+++ b/Project One Presentation.pptx
@@ -6781,7 +6781,7 @@
       </p:grpSpPr>
       <p:pic>
         <p:nvPicPr>
-          <p:cNvPr id="2" name="Picture 1" descr="Top Five Zip Codes for Family.png"/>
+          <p:cNvPr id="4" name="Picture 3" descr="Top Five Zip Codes for Family.png"/>
           <p:cNvPicPr>
             <a:picLocks noChangeAspect="1"/>
           </p:cNvPicPr>
@@ -6801,8 +6801,8 @@
         </p:blipFill>
         <p:spPr>
           <a:xfrm>
-            <a:off x="174625" y="2016124"/>
-            <a:ext cx="8756196" cy="4086225"/>
+            <a:off x="0" y="1545372"/>
+            <a:ext cx="9144000" cy="4267200"/>
           </a:xfrm>
           <a:prstGeom prst="rect">
             <a:avLst/>

</xml_diff>